<commit_message>
updated the work flow
</commit_message>
<xml_diff>
--- a/assets/mock-up.pptx
+++ b/assets/mock-up.pptx
@@ -11,6 +11,7 @@
     <p:sldId id="258" r:id="rId5"/>
     <p:sldId id="257" r:id="rId6"/>
     <p:sldId id="261" r:id="rId7"/>
+    <p:sldId id="262" r:id="rId8"/>
   </p:sldIdLst>
   <p:sldSz cx="12192000" cy="6858000"/>
   <p:notesSz cx="6858000" cy="9144000"/>
@@ -109,6 +110,11 @@
       </a:defRPr>
     </a:lvl9pPr>
   </p:defaultTextStyle>
+  <p:extLst>
+    <p:ext uri="{EFAFB233-063F-42B5-8137-9DF3F51BA10A}">
+      <p15:sldGuideLst xmlns:p15="http://schemas.microsoft.com/office/powerpoint/2012/main"/>
+    </p:ext>
+  </p:extLst>
 </p:presentation>
 </file>
 
@@ -1311,7 +1317,7 @@
           <a:p>
             <a:fld id="{A714743B-588B-4D60-9EB5-8E9A17C253EF}" type="datetimeFigureOut">
               <a:rPr lang="en-US" smtClean="0"/>
-              <a:t>5/23/2022</a:t>
+              <a:t>5/25/2022</a:t>
             </a:fld>
             <a:endParaRPr lang="en-US"/>
           </a:p>
@@ -1509,7 +1515,7 @@
           <a:p>
             <a:fld id="{A714743B-588B-4D60-9EB5-8E9A17C253EF}" type="datetimeFigureOut">
               <a:rPr lang="en-US" smtClean="0"/>
-              <a:t>5/23/2022</a:t>
+              <a:t>5/25/2022</a:t>
             </a:fld>
             <a:endParaRPr lang="en-US"/>
           </a:p>
@@ -1717,7 +1723,7 @@
           <a:p>
             <a:fld id="{A714743B-588B-4D60-9EB5-8E9A17C253EF}" type="datetimeFigureOut">
               <a:rPr lang="en-US" smtClean="0"/>
-              <a:t>5/23/2022</a:t>
+              <a:t>5/25/2022</a:t>
             </a:fld>
             <a:endParaRPr lang="en-US"/>
           </a:p>
@@ -1915,7 +1921,7 @@
           <a:p>
             <a:fld id="{A714743B-588B-4D60-9EB5-8E9A17C253EF}" type="datetimeFigureOut">
               <a:rPr lang="en-US" smtClean="0"/>
-              <a:t>5/23/2022</a:t>
+              <a:t>5/25/2022</a:t>
             </a:fld>
             <a:endParaRPr lang="en-US"/>
           </a:p>
@@ -2190,7 +2196,7 @@
           <a:p>
             <a:fld id="{A714743B-588B-4D60-9EB5-8E9A17C253EF}" type="datetimeFigureOut">
               <a:rPr lang="en-US" smtClean="0"/>
-              <a:t>5/23/2022</a:t>
+              <a:t>5/25/2022</a:t>
             </a:fld>
             <a:endParaRPr lang="en-US"/>
           </a:p>
@@ -2455,7 +2461,7 @@
           <a:p>
             <a:fld id="{A714743B-588B-4D60-9EB5-8E9A17C253EF}" type="datetimeFigureOut">
               <a:rPr lang="en-US" smtClean="0"/>
-              <a:t>5/23/2022</a:t>
+              <a:t>5/25/2022</a:t>
             </a:fld>
             <a:endParaRPr lang="en-US"/>
           </a:p>
@@ -2867,7 +2873,7 @@
           <a:p>
             <a:fld id="{A714743B-588B-4D60-9EB5-8E9A17C253EF}" type="datetimeFigureOut">
               <a:rPr lang="en-US" smtClean="0"/>
-              <a:t>5/23/2022</a:t>
+              <a:t>5/25/2022</a:t>
             </a:fld>
             <a:endParaRPr lang="en-US"/>
           </a:p>
@@ -3008,7 +3014,7 @@
           <a:p>
             <a:fld id="{A714743B-588B-4D60-9EB5-8E9A17C253EF}" type="datetimeFigureOut">
               <a:rPr lang="en-US" smtClean="0"/>
-              <a:t>5/23/2022</a:t>
+              <a:t>5/25/2022</a:t>
             </a:fld>
             <a:endParaRPr lang="en-US"/>
           </a:p>
@@ -3121,7 +3127,7 @@
           <a:p>
             <a:fld id="{A714743B-588B-4D60-9EB5-8E9A17C253EF}" type="datetimeFigureOut">
               <a:rPr lang="en-US" smtClean="0"/>
-              <a:t>5/23/2022</a:t>
+              <a:t>5/25/2022</a:t>
             </a:fld>
             <a:endParaRPr lang="en-US"/>
           </a:p>
@@ -3432,7 +3438,7 @@
           <a:p>
             <a:fld id="{A714743B-588B-4D60-9EB5-8E9A17C253EF}" type="datetimeFigureOut">
               <a:rPr lang="en-US" smtClean="0"/>
-              <a:t>5/23/2022</a:t>
+              <a:t>5/25/2022</a:t>
             </a:fld>
             <a:endParaRPr lang="en-US"/>
           </a:p>
@@ -3720,7 +3726,7 @@
           <a:p>
             <a:fld id="{A714743B-588B-4D60-9EB5-8E9A17C253EF}" type="datetimeFigureOut">
               <a:rPr lang="en-US" smtClean="0"/>
-              <a:t>5/23/2022</a:t>
+              <a:t>5/25/2022</a:t>
             </a:fld>
             <a:endParaRPr lang="en-US"/>
           </a:p>
@@ -3961,7 +3967,7 @@
           <a:p>
             <a:fld id="{A714743B-588B-4D60-9EB5-8E9A17C253EF}" type="datetimeFigureOut">
               <a:rPr lang="en-US" smtClean="0"/>
-              <a:t>5/23/2022</a:t>
+              <a:t>5/25/2022</a:t>
             </a:fld>
             <a:endParaRPr lang="en-US"/>
           </a:p>
@@ -4691,6 +4697,56 @@
           </a:p>
         </p:txBody>
       </p:sp>
+      <p:sp>
+        <p:nvSpPr>
+          <p:cNvPr id="9" name="Rectangle 8">
+            <a:extLst>
+              <a:ext uri="{FF2B5EF4-FFF2-40B4-BE49-F238E27FC236}">
+                <a16:creationId xmlns:a16="http://schemas.microsoft.com/office/drawing/2014/main" id="{300DCEEC-3C12-161A-C301-0720733EE2CA}"/>
+              </a:ext>
+            </a:extLst>
+          </p:cNvPr>
+          <p:cNvSpPr/>
+          <p:nvPr/>
+        </p:nvSpPr>
+        <p:spPr>
+          <a:xfrm>
+            <a:off x="6768934" y="4090211"/>
+            <a:ext cx="3542239" cy="523220"/>
+          </a:xfrm>
+          <a:prstGeom prst="rect">
+            <a:avLst/>
+          </a:prstGeom>
+          <a:noFill/>
+        </p:spPr>
+        <p:txBody>
+          <a:bodyPr wrap="square" lIns="91440" tIns="45720" rIns="91440" bIns="45720">
+            <a:spAutoFit/>
+          </a:bodyPr>
+          <a:lstStyle/>
+          <a:p>
+            <a:pPr algn="ctr"/>
+            <a:r>
+              <a:rPr lang="en-US" sz="2800" b="1" cap="none" spc="0" dirty="0">
+                <a:ln w="22225">
+                  <a:solidFill>
+                    <a:schemeClr val="accent2"/>
+                  </a:solidFill>
+                  <a:prstDash val="solid"/>
+                </a:ln>
+                <a:solidFill>
+                  <a:schemeClr val="accent2">
+                    <a:lumMod val="40000"/>
+                    <a:lumOff val="60000"/>
+                  </a:schemeClr>
+                </a:solidFill>
+                <a:effectLst/>
+              </a:rPr>
+              <a:t>Bobby – Day 1</a:t>
+            </a:r>
+          </a:p>
+        </p:txBody>
+      </p:sp>
     </p:spTree>
     <p:extLst>
       <p:ext uri="{BB962C8B-B14F-4D97-AF65-F5344CB8AC3E}">
@@ -5430,6 +5486,56 @@
                 </a:solidFill>
               </a:rPr>
               <a:t>Tickers Remaining</a:t>
+            </a:r>
+          </a:p>
+        </p:txBody>
+      </p:sp>
+      <p:sp>
+        <p:nvSpPr>
+          <p:cNvPr id="13" name="Rectangle 12">
+            <a:extLst>
+              <a:ext uri="{FF2B5EF4-FFF2-40B4-BE49-F238E27FC236}">
+                <a16:creationId xmlns:a16="http://schemas.microsoft.com/office/drawing/2014/main" id="{61097341-FB98-E3D0-7B04-BCF92AA172B6}"/>
+              </a:ext>
+            </a:extLst>
+          </p:cNvPr>
+          <p:cNvSpPr/>
+          <p:nvPr/>
+        </p:nvSpPr>
+        <p:spPr>
+          <a:xfrm>
+            <a:off x="3565926" y="13565"/>
+            <a:ext cx="3542239" cy="523220"/>
+          </a:xfrm>
+          <a:prstGeom prst="rect">
+            <a:avLst/>
+          </a:prstGeom>
+          <a:noFill/>
+        </p:spPr>
+        <p:txBody>
+          <a:bodyPr wrap="square" lIns="91440" tIns="45720" rIns="91440" bIns="45720">
+            <a:spAutoFit/>
+          </a:bodyPr>
+          <a:lstStyle/>
+          <a:p>
+            <a:pPr algn="ctr"/>
+            <a:r>
+              <a:rPr lang="en-US" sz="2800" b="1" cap="none" spc="0" dirty="0">
+                <a:ln w="22225">
+                  <a:solidFill>
+                    <a:schemeClr val="accent2"/>
+                  </a:solidFill>
+                  <a:prstDash val="solid"/>
+                </a:ln>
+                <a:solidFill>
+                  <a:schemeClr val="accent2">
+                    <a:lumMod val="40000"/>
+                    <a:lumOff val="60000"/>
+                  </a:schemeClr>
+                </a:solidFill>
+                <a:effectLst/>
+              </a:rPr>
+              <a:t>Bobby – Day 1</a:t>
             </a:r>
           </a:p>
         </p:txBody>
@@ -6815,6 +6921,56 @@
             <a:r>
               <a:rPr lang="en-US" dirty="0"/>
               <a:t>D</a:t>
+            </a:r>
+          </a:p>
+        </p:txBody>
+      </p:sp>
+      <p:sp>
+        <p:nvSpPr>
+          <p:cNvPr id="5" name="Rectangle 4">
+            <a:extLst>
+              <a:ext uri="{FF2B5EF4-FFF2-40B4-BE49-F238E27FC236}">
+                <a16:creationId xmlns:a16="http://schemas.microsoft.com/office/drawing/2014/main" id="{B55FB3EB-674E-C2D9-CCA3-21CF4F7047A8}"/>
+              </a:ext>
+            </a:extLst>
+          </p:cNvPr>
+          <p:cNvSpPr/>
+          <p:nvPr/>
+        </p:nvSpPr>
+        <p:spPr>
+          <a:xfrm>
+            <a:off x="2432648" y="5093821"/>
+            <a:ext cx="1756571" cy="923330"/>
+          </a:xfrm>
+          <a:prstGeom prst="rect">
+            <a:avLst/>
+          </a:prstGeom>
+          <a:noFill/>
+        </p:spPr>
+        <p:txBody>
+          <a:bodyPr wrap="none" lIns="91440" tIns="45720" rIns="91440" bIns="45720">
+            <a:spAutoFit/>
+          </a:bodyPr>
+          <a:lstStyle/>
+          <a:p>
+            <a:pPr algn="ctr"/>
+            <a:r>
+              <a:rPr lang="en-US" sz="5400" b="1" cap="none" spc="0" dirty="0">
+                <a:ln w="22225">
+                  <a:solidFill>
+                    <a:schemeClr val="accent2"/>
+                  </a:solidFill>
+                  <a:prstDash val="solid"/>
+                </a:ln>
+                <a:solidFill>
+                  <a:schemeClr val="accent2">
+                    <a:lumMod val="40000"/>
+                    <a:lumOff val="60000"/>
+                  </a:schemeClr>
+                </a:solidFill>
+                <a:effectLst/>
+              </a:rPr>
+              <a:t>Steve</a:t>
             </a:r>
           </a:p>
         </p:txBody>
@@ -7555,7 +7711,7 @@
                     <a:bodyPr/>
                     <a:lstStyle/>
                     <a:p>
-                      <a:endParaRPr lang="en-US"/>
+                      <a:endParaRPr lang="en-US" dirty="0"/>
                     </a:p>
                   </a:txBody>
                   <a:tcPr/>
@@ -8144,6 +8300,56 @@
                 </a:solidFill>
               </a:rPr>
               <a:t>Portfolio Update</a:t>
+            </a:r>
+          </a:p>
+        </p:txBody>
+      </p:sp>
+      <p:sp>
+        <p:nvSpPr>
+          <p:cNvPr id="11" name="Rectangle 10">
+            <a:extLst>
+              <a:ext uri="{FF2B5EF4-FFF2-40B4-BE49-F238E27FC236}">
+                <a16:creationId xmlns:a16="http://schemas.microsoft.com/office/drawing/2014/main" id="{D0175F23-D31C-1349-18D1-AF0D6ED4C292}"/>
+              </a:ext>
+            </a:extLst>
+          </p:cNvPr>
+          <p:cNvSpPr/>
+          <p:nvPr/>
+        </p:nvSpPr>
+        <p:spPr>
+          <a:xfrm>
+            <a:off x="3510950" y="2863414"/>
+            <a:ext cx="1756571" cy="923330"/>
+          </a:xfrm>
+          <a:prstGeom prst="rect">
+            <a:avLst/>
+          </a:prstGeom>
+          <a:noFill/>
+        </p:spPr>
+        <p:txBody>
+          <a:bodyPr wrap="none" lIns="91440" tIns="45720" rIns="91440" bIns="45720">
+            <a:spAutoFit/>
+          </a:bodyPr>
+          <a:lstStyle/>
+          <a:p>
+            <a:pPr algn="ctr"/>
+            <a:r>
+              <a:rPr lang="en-US" sz="5400" b="1" cap="none" spc="0" dirty="0">
+                <a:ln w="22225">
+                  <a:solidFill>
+                    <a:schemeClr val="accent2"/>
+                  </a:solidFill>
+                  <a:prstDash val="solid"/>
+                </a:ln>
+                <a:solidFill>
+                  <a:schemeClr val="accent2">
+                    <a:lumMod val="40000"/>
+                    <a:lumOff val="60000"/>
+                  </a:schemeClr>
+                </a:solidFill>
+                <a:effectLst/>
+              </a:rPr>
+              <a:t>Steve</a:t>
             </a:r>
           </a:p>
         </p:txBody>
@@ -8748,6 +8954,582 @@
     <p:extLst>
       <p:ext uri="{BB962C8B-B14F-4D97-AF65-F5344CB8AC3E}">
         <p14:creationId xmlns:p14="http://schemas.microsoft.com/office/powerpoint/2010/main" val="3626440144"/>
+      </p:ext>
+    </p:extLst>
+  </p:cSld>
+  <p:clrMapOvr>
+    <a:masterClrMapping/>
+  </p:clrMapOvr>
+</p:sld>
+</file>
+
+<file path=ppt/slides/slide7.xml><?xml version="1.0" encoding="utf-8"?>
+<p:sld xmlns:a="http://schemas.openxmlformats.org/drawingml/2006/main" xmlns:r="http://schemas.openxmlformats.org/officeDocument/2006/relationships" xmlns:p="http://schemas.openxmlformats.org/presentationml/2006/main">
+  <p:cSld>
+    <p:spTree>
+      <p:nvGrpSpPr>
+        <p:cNvPr id="1" name=""/>
+        <p:cNvGrpSpPr/>
+        <p:nvPr/>
+      </p:nvGrpSpPr>
+      <p:grpSpPr>
+        <a:xfrm>
+          <a:off x="0" y="0"/>
+          <a:ext cx="0" cy="0"/>
+          <a:chOff x="0" y="0"/>
+          <a:chExt cx="0" cy="0"/>
+        </a:xfrm>
+      </p:grpSpPr>
+      <p:graphicFrame>
+        <p:nvGraphicFramePr>
+          <p:cNvPr id="2" name="Table 2">
+            <a:extLst>
+              <a:ext uri="{FF2B5EF4-FFF2-40B4-BE49-F238E27FC236}">
+                <a16:creationId xmlns:a16="http://schemas.microsoft.com/office/drawing/2014/main" id="{54AC9C56-141B-48BB-FF6A-262DCB448895}"/>
+              </a:ext>
+            </a:extLst>
+          </p:cNvPr>
+          <p:cNvGraphicFramePr>
+            <a:graphicFrameLocks noGrp="1"/>
+          </p:cNvGraphicFramePr>
+          <p:nvPr>
+            <p:extLst>
+              <p:ext uri="{D42A27DB-BD31-4B8C-83A1-F6EECF244321}">
+                <p14:modId xmlns:p14="http://schemas.microsoft.com/office/powerpoint/2010/main" val="3810132377"/>
+              </p:ext>
+            </p:extLst>
+          </p:nvPr>
+        </p:nvGraphicFramePr>
+        <p:xfrm>
+          <a:off x="983409" y="719666"/>
+          <a:ext cx="10757141" cy="2595880"/>
+        </p:xfrm>
+        <a:graphic>
+          <a:graphicData uri="http://schemas.openxmlformats.org/drawingml/2006/table">
+            <a:tbl>
+              <a:tblPr firstRow="1" bandRow="1">
+                <a:tableStyleId>{5C22544A-7EE6-4342-B048-85BDC9FD1C3A}</a:tableStyleId>
+              </a:tblPr>
+              <a:tblGrid>
+                <a:gridCol w="1725119">
+                  <a:extLst>
+                    <a:ext uri="{9D8B030D-6E8A-4147-A177-3AD203B41FA5}">
+                      <a16:colId xmlns:a16="http://schemas.microsoft.com/office/drawing/2014/main" val="422717253"/>
+                    </a:ext>
+                  </a:extLst>
+                </a:gridCol>
+                <a:gridCol w="2709607">
+                  <a:extLst>
+                    <a:ext uri="{9D8B030D-6E8A-4147-A177-3AD203B41FA5}">
+                      <a16:colId xmlns:a16="http://schemas.microsoft.com/office/drawing/2014/main" val="3290612716"/>
+                    </a:ext>
+                  </a:extLst>
+                </a:gridCol>
+                <a:gridCol w="2610255">
+                  <a:extLst>
+                    <a:ext uri="{9D8B030D-6E8A-4147-A177-3AD203B41FA5}">
+                      <a16:colId xmlns:a16="http://schemas.microsoft.com/office/drawing/2014/main" val="109729548"/>
+                    </a:ext>
+                  </a:extLst>
+                </a:gridCol>
+                <a:gridCol w="3712160">
+                  <a:extLst>
+                    <a:ext uri="{9D8B030D-6E8A-4147-A177-3AD203B41FA5}">
+                      <a16:colId xmlns:a16="http://schemas.microsoft.com/office/drawing/2014/main" val="724066181"/>
+                    </a:ext>
+                  </a:extLst>
+                </a:gridCol>
+              </a:tblGrid>
+              <a:tr h="370840">
+                <a:tc>
+                  <a:txBody>
+                    <a:bodyPr/>
+                    <a:lstStyle/>
+                    <a:p>
+                      <a:r>
+                        <a:rPr lang="en-US" dirty="0"/>
+                        <a:t>Day</a:t>
+                      </a:r>
+                    </a:p>
+                  </a:txBody>
+                  <a:tcPr/>
+                </a:tc>
+                <a:tc>
+                  <a:txBody>
+                    <a:bodyPr/>
+                    <a:lstStyle/>
+                    <a:p>
+                      <a:r>
+                        <a:rPr lang="en-US" dirty="0"/>
+                        <a:t>Steve</a:t>
+                      </a:r>
+                    </a:p>
+                  </a:txBody>
+                  <a:tcPr/>
+                </a:tc>
+                <a:tc>
+                  <a:txBody>
+                    <a:bodyPr/>
+                    <a:lstStyle/>
+                    <a:p>
+                      <a:r>
+                        <a:rPr lang="en-US" dirty="0"/>
+                        <a:t>Bobby</a:t>
+                      </a:r>
+                    </a:p>
+                  </a:txBody>
+                  <a:tcPr/>
+                </a:tc>
+                <a:tc>
+                  <a:txBody>
+                    <a:bodyPr/>
+                    <a:lstStyle/>
+                    <a:p>
+                      <a:r>
+                        <a:rPr lang="en-US" dirty="0"/>
+                        <a:t>Lawrence</a:t>
+                      </a:r>
+                    </a:p>
+                  </a:txBody>
+                  <a:tcPr/>
+                </a:tc>
+                <a:extLst>
+                  <a:ext uri="{0D108BD9-81ED-4DB2-BD59-A6C34878D82A}">
+                    <a16:rowId xmlns:a16="http://schemas.microsoft.com/office/drawing/2014/main" val="42260603"/>
+                  </a:ext>
+                </a:extLst>
+              </a:tr>
+              <a:tr h="370840">
+                <a:tc>
+                  <a:txBody>
+                    <a:bodyPr/>
+                    <a:lstStyle/>
+                    <a:p>
+                      <a:r>
+                        <a:rPr lang="en-US" dirty="0"/>
+                        <a:t>1 – 23 May</a:t>
+                      </a:r>
+                    </a:p>
+                  </a:txBody>
+                  <a:tcPr/>
+                </a:tc>
+                <a:tc>
+                  <a:txBody>
+                    <a:bodyPr/>
+                    <a:lstStyle/>
+                    <a:p>
+                      <a:endParaRPr lang="en-US"/>
+                    </a:p>
+                  </a:txBody>
+                  <a:tcPr/>
+                </a:tc>
+                <a:tc>
+                  <a:txBody>
+                    <a:bodyPr/>
+                    <a:lstStyle/>
+                    <a:p>
+                      <a:endParaRPr lang="en-US"/>
+                    </a:p>
+                  </a:txBody>
+                  <a:tcPr/>
+                </a:tc>
+                <a:tc>
+                  <a:txBody>
+                    <a:bodyPr/>
+                    <a:lstStyle/>
+                    <a:p>
+                      <a:endParaRPr lang="en-US"/>
+                    </a:p>
+                  </a:txBody>
+                  <a:tcPr/>
+                </a:tc>
+                <a:extLst>
+                  <a:ext uri="{0D108BD9-81ED-4DB2-BD59-A6C34878D82A}">
+                    <a16:rowId xmlns:a16="http://schemas.microsoft.com/office/drawing/2014/main" val="1576088647"/>
+                  </a:ext>
+                </a:extLst>
+              </a:tr>
+              <a:tr h="370840">
+                <a:tc>
+                  <a:txBody>
+                    <a:bodyPr/>
+                    <a:lstStyle/>
+                    <a:p>
+                      <a:r>
+                        <a:rPr lang="en-US" dirty="0"/>
+                        <a:t>2 -25 May</a:t>
+                      </a:r>
+                    </a:p>
+                  </a:txBody>
+                  <a:tcPr/>
+                </a:tc>
+                <a:tc>
+                  <a:txBody>
+                    <a:bodyPr/>
+                    <a:lstStyle/>
+                    <a:p>
+                      <a:r>
+                        <a:rPr lang="en-US" dirty="0"/>
+                        <a:t>Database and seeds file</a:t>
+                      </a:r>
+                    </a:p>
+                  </a:txBody>
+                  <a:tcPr/>
+                </a:tc>
+                <a:tc>
+                  <a:txBody>
+                    <a:bodyPr/>
+                    <a:lstStyle/>
+                    <a:p>
+                      <a:r>
+                        <a:rPr lang="en-US" dirty="0"/>
+                        <a:t>Welcome page, navbar</a:t>
+                      </a:r>
+                    </a:p>
+                  </a:txBody>
+                  <a:tcPr/>
+                </a:tc>
+                <a:tc>
+                  <a:txBody>
+                    <a:bodyPr/>
+                    <a:lstStyle/>
+                    <a:p>
+                      <a:r>
+                        <a:rPr lang="en-US" dirty="0"/>
+                        <a:t>API calls; company prospectus pages</a:t>
+                      </a:r>
+                    </a:p>
+                  </a:txBody>
+                  <a:tcPr/>
+                </a:tc>
+                <a:extLst>
+                  <a:ext uri="{0D108BD9-81ED-4DB2-BD59-A6C34878D82A}">
+                    <a16:rowId xmlns:a16="http://schemas.microsoft.com/office/drawing/2014/main" val="2469140669"/>
+                  </a:ext>
+                </a:extLst>
+              </a:tr>
+              <a:tr h="370840">
+                <a:tc>
+                  <a:txBody>
+                    <a:bodyPr/>
+                    <a:lstStyle/>
+                    <a:p>
+                      <a:r>
+                        <a:rPr lang="en-US" dirty="0"/>
+                        <a:t>3 – 28 May</a:t>
+                      </a:r>
+                    </a:p>
+                  </a:txBody>
+                  <a:tcPr/>
+                </a:tc>
+                <a:tc>
+                  <a:txBody>
+                    <a:bodyPr/>
+                    <a:lstStyle/>
+                    <a:p>
+                      <a:r>
+                        <a:rPr lang="en-US" dirty="0"/>
+                        <a:t>Sortable / clickable tables</a:t>
+                      </a:r>
+                    </a:p>
+                  </a:txBody>
+                  <a:tcPr/>
+                </a:tc>
+                <a:tc>
+                  <a:txBody>
+                    <a:bodyPr/>
+                    <a:lstStyle/>
+                    <a:p>
+                      <a:r>
+                        <a:rPr lang="en-US" dirty="0"/>
+                        <a:t>All page scaffolds</a:t>
+                      </a:r>
+                    </a:p>
+                  </a:txBody>
+                  <a:tcPr/>
+                </a:tc>
+                <a:tc>
+                  <a:txBody>
+                    <a:bodyPr/>
+                    <a:lstStyle/>
+                    <a:p>
+                      <a:r>
+                        <a:rPr lang="en-US" dirty="0"/>
+                        <a:t>Resolvers Typedefs</a:t>
+                      </a:r>
+                    </a:p>
+                  </a:txBody>
+                  <a:tcPr/>
+                </a:tc>
+                <a:extLst>
+                  <a:ext uri="{0D108BD9-81ED-4DB2-BD59-A6C34878D82A}">
+                    <a16:rowId xmlns:a16="http://schemas.microsoft.com/office/drawing/2014/main" val="2330515861"/>
+                  </a:ext>
+                </a:extLst>
+              </a:tr>
+              <a:tr h="370840">
+                <a:tc>
+                  <a:txBody>
+                    <a:bodyPr/>
+                    <a:lstStyle/>
+                    <a:p>
+                      <a:r>
+                        <a:rPr lang="en-US" dirty="0"/>
+                        <a:t>4 – 30 May</a:t>
+                      </a:r>
+                    </a:p>
+                  </a:txBody>
+                  <a:tcPr/>
+                </a:tc>
+                <a:tc>
+                  <a:txBody>
+                    <a:bodyPr/>
+                    <a:lstStyle/>
+                    <a:p>
+                      <a:r>
+                        <a:rPr lang="en-US" dirty="0"/>
+                        <a:t>Performance Graph</a:t>
+                      </a:r>
+                    </a:p>
+                  </a:txBody>
+                  <a:tcPr/>
+                </a:tc>
+                <a:tc>
+                  <a:txBody>
+                    <a:bodyPr/>
+                    <a:lstStyle/>
+                    <a:p>
+                      <a:r>
+                        <a:rPr lang="en-US" dirty="0"/>
+                        <a:t>Ticker, styling</a:t>
+                      </a:r>
+                    </a:p>
+                  </a:txBody>
+                  <a:tcPr/>
+                </a:tc>
+                <a:tc>
+                  <a:txBody>
+                    <a:bodyPr/>
+                    <a:lstStyle/>
+                    <a:p>
+                      <a:r>
+                        <a:rPr lang="en-US" dirty="0"/>
+                        <a:t>Resolvers Typedefs</a:t>
+                      </a:r>
+                    </a:p>
+                  </a:txBody>
+                  <a:tcPr/>
+                </a:tc>
+                <a:extLst>
+                  <a:ext uri="{0D108BD9-81ED-4DB2-BD59-A6C34878D82A}">
+                    <a16:rowId xmlns:a16="http://schemas.microsoft.com/office/drawing/2014/main" val="1666854308"/>
+                  </a:ext>
+                </a:extLst>
+              </a:tr>
+              <a:tr h="370840">
+                <a:tc>
+                  <a:txBody>
+                    <a:bodyPr/>
+                    <a:lstStyle/>
+                    <a:p>
+                      <a:r>
+                        <a:rPr lang="en-US" dirty="0"/>
+                        <a:t>5 – 1 Jun</a:t>
+                      </a:r>
+                    </a:p>
+                  </a:txBody>
+                  <a:tcPr/>
+                </a:tc>
+                <a:tc>
+                  <a:txBody>
+                    <a:bodyPr/>
+                    <a:lstStyle/>
+                    <a:p>
+                      <a:endParaRPr lang="en-US" dirty="0"/>
+                    </a:p>
+                  </a:txBody>
+                  <a:tcPr/>
+                </a:tc>
+                <a:tc>
+                  <a:txBody>
+                    <a:bodyPr/>
+                    <a:lstStyle/>
+                    <a:p>
+                      <a:endParaRPr lang="en-US"/>
+                    </a:p>
+                  </a:txBody>
+                  <a:tcPr/>
+                </a:tc>
+                <a:tc>
+                  <a:txBody>
+                    <a:bodyPr/>
+                    <a:lstStyle/>
+                    <a:p>
+                      <a:endParaRPr lang="en-US"/>
+                    </a:p>
+                  </a:txBody>
+                  <a:tcPr/>
+                </a:tc>
+                <a:extLst>
+                  <a:ext uri="{0D108BD9-81ED-4DB2-BD59-A6C34878D82A}">
+                    <a16:rowId xmlns:a16="http://schemas.microsoft.com/office/drawing/2014/main" val="205700147"/>
+                  </a:ext>
+                </a:extLst>
+              </a:tr>
+              <a:tr h="370840">
+                <a:tc>
+                  <a:txBody>
+                    <a:bodyPr/>
+                    <a:lstStyle/>
+                    <a:p>
+                      <a:r>
+                        <a:rPr lang="en-US" dirty="0"/>
+                        <a:t>6 – 4 Jun</a:t>
+                      </a:r>
+                    </a:p>
+                  </a:txBody>
+                  <a:tcPr/>
+                </a:tc>
+                <a:tc>
+                  <a:txBody>
+                    <a:bodyPr/>
+                    <a:lstStyle/>
+                    <a:p>
+                      <a:r>
+                        <a:rPr lang="en-US" dirty="0"/>
+                        <a:t>Clean up</a:t>
+                      </a:r>
+                    </a:p>
+                  </a:txBody>
+                  <a:tcPr/>
+                </a:tc>
+                <a:tc>
+                  <a:txBody>
+                    <a:bodyPr/>
+                    <a:lstStyle/>
+                    <a:p>
+                      <a:r>
+                        <a:rPr lang="en-US" dirty="0"/>
+                        <a:t>Clean up</a:t>
+                      </a:r>
+                    </a:p>
+                  </a:txBody>
+                  <a:tcPr/>
+                </a:tc>
+                <a:tc>
+                  <a:txBody>
+                    <a:bodyPr/>
+                    <a:lstStyle/>
+                    <a:p>
+                      <a:r>
+                        <a:rPr lang="en-US" dirty="0"/>
+                        <a:t>Clean up</a:t>
+                      </a:r>
+                    </a:p>
+                  </a:txBody>
+                  <a:tcPr/>
+                </a:tc>
+                <a:extLst>
+                  <a:ext uri="{0D108BD9-81ED-4DB2-BD59-A6C34878D82A}">
+                    <a16:rowId xmlns:a16="http://schemas.microsoft.com/office/drawing/2014/main" val="2804277024"/>
+                  </a:ext>
+                </a:extLst>
+              </a:tr>
+            </a:tbl>
+          </a:graphicData>
+        </a:graphic>
+      </p:graphicFrame>
+      <p:sp>
+        <p:nvSpPr>
+          <p:cNvPr id="3" name="TextBox 2">
+            <a:extLst>
+              <a:ext uri="{FF2B5EF4-FFF2-40B4-BE49-F238E27FC236}">
+                <a16:creationId xmlns:a16="http://schemas.microsoft.com/office/drawing/2014/main" id="{05A10D40-F10E-A1DE-380A-544273BB0CFF}"/>
+              </a:ext>
+            </a:extLst>
+          </p:cNvPr>
+          <p:cNvSpPr txBox="1"/>
+          <p:nvPr/>
+        </p:nvSpPr>
+        <p:spPr>
+          <a:xfrm>
+            <a:off x="2363638" y="3821502"/>
+            <a:ext cx="5589917" cy="2862322"/>
+          </a:xfrm>
+          <a:prstGeom prst="rect">
+            <a:avLst/>
+          </a:prstGeom>
+          <a:noFill/>
+        </p:spPr>
+        <p:txBody>
+          <a:bodyPr wrap="square" rtlCol="0">
+            <a:spAutoFit/>
+          </a:bodyPr>
+          <a:lstStyle/>
+          <a:p>
+            <a:r>
+              <a:rPr lang="en-US" dirty="0"/>
+              <a:t>Login</a:t>
+            </a:r>
+          </a:p>
+          <a:p>
+            <a:r>
+              <a:rPr lang="en-US" dirty="0" err="1"/>
+              <a:t>JWT</a:t>
+            </a:r>
+            <a:endParaRPr lang="en-US" dirty="0"/>
+          </a:p>
+          <a:p>
+            <a:r>
+              <a:rPr lang="en-US" dirty="0"/>
+              <a:t>Database</a:t>
+            </a:r>
+          </a:p>
+          <a:p>
+            <a:r>
+              <a:rPr lang="en-US" dirty="0"/>
+              <a:t>Page Scaffolding</a:t>
+            </a:r>
+          </a:p>
+          <a:p>
+            <a:r>
+              <a:rPr lang="en-US" dirty="0"/>
+              <a:t>Resolvers</a:t>
+            </a:r>
+          </a:p>
+          <a:p>
+            <a:r>
+              <a:rPr lang="en-US" dirty="0"/>
+              <a:t>Typedefs</a:t>
+            </a:r>
+          </a:p>
+          <a:p>
+            <a:r>
+              <a:rPr lang="en-US" dirty="0"/>
+              <a:t>Performance Graph</a:t>
+            </a:r>
+          </a:p>
+          <a:p>
+            <a:r>
+              <a:rPr lang="en-US" dirty="0"/>
+              <a:t>Modal for selecting portfolios</a:t>
+            </a:r>
+          </a:p>
+          <a:p>
+            <a:r>
+              <a:rPr lang="en-US" dirty="0"/>
+              <a:t>Ticker Counter</a:t>
+            </a:r>
+          </a:p>
+          <a:p>
+            <a:endParaRPr lang="en-US" dirty="0"/>
+          </a:p>
+        </p:txBody>
+      </p:sp>
+    </p:spTree>
+    <p:extLst>
+      <p:ext uri="{BB962C8B-B14F-4D97-AF65-F5344CB8AC3E}">
+        <p14:creationId xmlns:p14="http://schemas.microsoft.com/office/powerpoint/2010/main" val="2912262352"/>
       </p:ext>
     </p:extLst>
   </p:cSld>

</xml_diff>

<commit_message>
fixed the graphQL errors and the initial table is up and running.  Still need to create the rest of the tables.
</commit_message>
<xml_diff>
--- a/assets/mock-up.pptx
+++ b/assets/mock-up.pptx
@@ -1317,7 +1317,7 @@
           <a:p>
             <a:fld id="{A714743B-588B-4D60-9EB5-8E9A17C253EF}" type="datetimeFigureOut">
               <a:rPr lang="en-US" smtClean="0"/>
-              <a:t>5/25/2022</a:t>
+              <a:t>6/1/2022</a:t>
             </a:fld>
             <a:endParaRPr lang="en-US"/>
           </a:p>
@@ -1515,7 +1515,7 @@
           <a:p>
             <a:fld id="{A714743B-588B-4D60-9EB5-8E9A17C253EF}" type="datetimeFigureOut">
               <a:rPr lang="en-US" smtClean="0"/>
-              <a:t>5/25/2022</a:t>
+              <a:t>6/1/2022</a:t>
             </a:fld>
             <a:endParaRPr lang="en-US"/>
           </a:p>
@@ -1723,7 +1723,7 @@
           <a:p>
             <a:fld id="{A714743B-588B-4D60-9EB5-8E9A17C253EF}" type="datetimeFigureOut">
               <a:rPr lang="en-US" smtClean="0"/>
-              <a:t>5/25/2022</a:t>
+              <a:t>6/1/2022</a:t>
             </a:fld>
             <a:endParaRPr lang="en-US"/>
           </a:p>
@@ -1921,7 +1921,7 @@
           <a:p>
             <a:fld id="{A714743B-588B-4D60-9EB5-8E9A17C253EF}" type="datetimeFigureOut">
               <a:rPr lang="en-US" smtClean="0"/>
-              <a:t>5/25/2022</a:t>
+              <a:t>6/1/2022</a:t>
             </a:fld>
             <a:endParaRPr lang="en-US"/>
           </a:p>
@@ -2196,7 +2196,7 @@
           <a:p>
             <a:fld id="{A714743B-588B-4D60-9EB5-8E9A17C253EF}" type="datetimeFigureOut">
               <a:rPr lang="en-US" smtClean="0"/>
-              <a:t>5/25/2022</a:t>
+              <a:t>6/1/2022</a:t>
             </a:fld>
             <a:endParaRPr lang="en-US"/>
           </a:p>
@@ -2461,7 +2461,7 @@
           <a:p>
             <a:fld id="{A714743B-588B-4D60-9EB5-8E9A17C253EF}" type="datetimeFigureOut">
               <a:rPr lang="en-US" smtClean="0"/>
-              <a:t>5/25/2022</a:t>
+              <a:t>6/1/2022</a:t>
             </a:fld>
             <a:endParaRPr lang="en-US"/>
           </a:p>
@@ -2873,7 +2873,7 @@
           <a:p>
             <a:fld id="{A714743B-588B-4D60-9EB5-8E9A17C253EF}" type="datetimeFigureOut">
               <a:rPr lang="en-US" smtClean="0"/>
-              <a:t>5/25/2022</a:t>
+              <a:t>6/1/2022</a:t>
             </a:fld>
             <a:endParaRPr lang="en-US"/>
           </a:p>
@@ -3014,7 +3014,7 @@
           <a:p>
             <a:fld id="{A714743B-588B-4D60-9EB5-8E9A17C253EF}" type="datetimeFigureOut">
               <a:rPr lang="en-US" smtClean="0"/>
-              <a:t>5/25/2022</a:t>
+              <a:t>6/1/2022</a:t>
             </a:fld>
             <a:endParaRPr lang="en-US"/>
           </a:p>
@@ -3127,7 +3127,7 @@
           <a:p>
             <a:fld id="{A714743B-588B-4D60-9EB5-8E9A17C253EF}" type="datetimeFigureOut">
               <a:rPr lang="en-US" smtClean="0"/>
-              <a:t>5/25/2022</a:t>
+              <a:t>6/1/2022</a:t>
             </a:fld>
             <a:endParaRPr lang="en-US"/>
           </a:p>
@@ -3438,7 +3438,7 @@
           <a:p>
             <a:fld id="{A714743B-588B-4D60-9EB5-8E9A17C253EF}" type="datetimeFigureOut">
               <a:rPr lang="en-US" smtClean="0"/>
-              <a:t>5/25/2022</a:t>
+              <a:t>6/1/2022</a:t>
             </a:fld>
             <a:endParaRPr lang="en-US"/>
           </a:p>
@@ -3726,7 +3726,7 @@
           <a:p>
             <a:fld id="{A714743B-588B-4D60-9EB5-8E9A17C253EF}" type="datetimeFigureOut">
               <a:rPr lang="en-US" smtClean="0"/>
-              <a:t>5/25/2022</a:t>
+              <a:t>6/1/2022</a:t>
             </a:fld>
             <a:endParaRPr lang="en-US"/>
           </a:p>
@@ -3967,7 +3967,7 @@
           <a:p>
             <a:fld id="{A714743B-588B-4D60-9EB5-8E9A17C253EF}" type="datetimeFigureOut">
               <a:rPr lang="en-US" smtClean="0"/>
-              <a:t>5/25/2022</a:t>
+              <a:t>6/1/2022</a:t>
             </a:fld>
             <a:endParaRPr lang="en-US"/>
           </a:p>
@@ -7168,14 +7168,14 @@
           <p:nvPr>
             <p:extLst>
               <p:ext uri="{D42A27DB-BD31-4B8C-83A1-F6EECF244321}">
-                <p14:modId xmlns:p14="http://schemas.microsoft.com/office/powerpoint/2010/main" val="3591564493"/>
+                <p14:modId xmlns:p14="http://schemas.microsoft.com/office/powerpoint/2010/main" val="1385473036"/>
               </p:ext>
             </p:extLst>
           </p:nvPr>
         </p:nvGraphicFramePr>
         <p:xfrm>
           <a:off x="173727" y="1295559"/>
-          <a:ext cx="11958973" cy="3408680"/>
+          <a:ext cx="11151451" cy="3408680"/>
         </p:xfrm>
         <a:graphic>
           <a:graphicData uri="http://schemas.openxmlformats.org/drawingml/2006/table">
@@ -7240,13 +7240,6 @@
                     </a:ext>
                   </a:extLst>
                 </a:gridCol>
-                <a:gridCol w="807522">
-                  <a:extLst>
-                    <a:ext uri="{9D8B030D-6E8A-4147-A177-3AD203B41FA5}">
-                      <a16:colId xmlns:a16="http://schemas.microsoft.com/office/drawing/2014/main" val="1948007326"/>
-                    </a:ext>
-                  </a:extLst>
-                </a:gridCol>
                 <a:gridCol w="1480534">
                   <a:extLst>
                     <a:ext uri="{9D8B030D-6E8A-4147-A177-3AD203B41FA5}">
@@ -7394,39 +7387,6 @@
                     <a:bodyPr/>
                     <a:lstStyle/>
                     <a:p>
-                      <a:pPr marL="0" marR="0" lvl="0" indent="0" algn="l" defTabSz="914400" rtl="0" eaLnBrk="1" fontAlgn="auto" latinLnBrk="0" hangingPunct="1">
-                        <a:lnSpc>
-                          <a:spcPct val="100000"/>
-                        </a:lnSpc>
-                        <a:spcBef>
-                          <a:spcPts val="0"/>
-                        </a:spcBef>
-                        <a:spcAft>
-                          <a:spcPts val="0"/>
-                        </a:spcAft>
-                        <a:buClrTx/>
-                        <a:buSzTx/>
-                        <a:buFontTx/>
-                        <a:buNone/>
-                        <a:tabLst/>
-                        <a:defRPr/>
-                      </a:pPr>
-                      <a:r>
-                        <a:rPr lang="en-US" dirty="0"/>
-                        <a:t>YTD</a:t>
-                      </a:r>
-                    </a:p>
-                    <a:p>
-                      <a:endParaRPr lang="en-US" dirty="0"/>
-                    </a:p>
-                  </a:txBody>
-                  <a:tcPr/>
-                </a:tc>
-                <a:tc>
-                  <a:txBody>
-                    <a:bodyPr/>
-                    <a:lstStyle/>
-                    <a:p>
                       <a:r>
                         <a:rPr lang="en-US" dirty="0"/>
                         <a:t>Since Created</a:t>
@@ -7559,19 +7519,6 @@
                   </a:txBody>
                   <a:tcPr/>
                 </a:tc>
-                <a:tc>
-                  <a:txBody>
-                    <a:bodyPr/>
-                    <a:lstStyle/>
-                    <a:p>
-                      <a:r>
-                        <a:rPr lang="en-US" dirty="0"/>
-                        <a:t>Float</a:t>
-                      </a:r>
-                    </a:p>
-                  </a:txBody>
-                  <a:tcPr/>
-                </a:tc>
                 <a:extLst>
                   <a:ext uri="{0D108BD9-81ED-4DB2-BD59-A6C34878D82A}">
                     <a16:rowId xmlns:a16="http://schemas.microsoft.com/office/drawing/2014/main" val="1743634555"/>
@@ -7584,6 +7531,16 @@
                     <a:bodyPr/>
                     <a:lstStyle/>
                     <a:p>
+                      <a:endParaRPr lang="en-US" dirty="0"/>
+                    </a:p>
+                  </a:txBody>
+                  <a:tcPr/>
+                </a:tc>
+                <a:tc>
+                  <a:txBody>
+                    <a:bodyPr/>
+                    <a:lstStyle/>
+                    <a:p>
                       <a:endParaRPr lang="en-US"/>
                     </a:p>
                   </a:txBody>
@@ -7595,26 +7552,6 @@
                     <a:lstStyle/>
                     <a:p>
                       <a:endParaRPr lang="en-US"/>
-                    </a:p>
-                  </a:txBody>
-                  <a:tcPr/>
-                </a:tc>
-                <a:tc>
-                  <a:txBody>
-                    <a:bodyPr/>
-                    <a:lstStyle/>
-                    <a:p>
-                      <a:endParaRPr lang="en-US"/>
-                    </a:p>
-                  </a:txBody>
-                  <a:tcPr/>
-                </a:tc>
-                <a:tc>
-                  <a:txBody>
-                    <a:bodyPr/>
-                    <a:lstStyle/>
-                    <a:p>
-                      <a:endParaRPr lang="en-US" dirty="0"/>
                     </a:p>
                   </a:txBody>
                   <a:tcPr/>
@@ -7691,6 +7628,16 @@
                     <a:bodyPr/>
                     <a:lstStyle/>
                     <a:p>
+                      <a:endParaRPr lang="en-US" dirty="0"/>
+                    </a:p>
+                  </a:txBody>
+                  <a:tcPr/>
+                </a:tc>
+                <a:tc>
+                  <a:txBody>
+                    <a:bodyPr/>
+                    <a:lstStyle/>
+                    <a:p>
                       <a:endParaRPr lang="en-US"/>
                     </a:p>
                   </a:txBody>
@@ -7701,6 +7648,16 @@
                     <a:bodyPr/>
                     <a:lstStyle/>
                     <a:p>
+                      <a:endParaRPr lang="en-US" dirty="0"/>
+                    </a:p>
+                  </a:txBody>
+                  <a:tcPr/>
+                </a:tc>
+                <a:tc>
+                  <a:txBody>
+                    <a:bodyPr/>
+                    <a:lstStyle/>
+                    <a:p>
                       <a:endParaRPr lang="en-US"/>
                     </a:p>
                   </a:txBody>
@@ -7711,37 +7668,7 @@
                     <a:bodyPr/>
                     <a:lstStyle/>
                     <a:p>
-                      <a:endParaRPr lang="en-US" dirty="0"/>
-                    </a:p>
-                  </a:txBody>
-                  <a:tcPr/>
-                </a:tc>
-                <a:tc>
-                  <a:txBody>
-                    <a:bodyPr/>
-                    <a:lstStyle/>
-                    <a:p>
                       <a:endParaRPr lang="en-US"/>
-                    </a:p>
-                  </a:txBody>
-                  <a:tcPr/>
-                </a:tc>
-                <a:tc>
-                  <a:txBody>
-                    <a:bodyPr/>
-                    <a:lstStyle/>
-                    <a:p>
-                      <a:endParaRPr lang="en-US"/>
-                    </a:p>
-                  </a:txBody>
-                  <a:tcPr/>
-                </a:tc>
-                <a:tc>
-                  <a:txBody>
-                    <a:bodyPr/>
-                    <a:lstStyle/>
-                    <a:p>
-                      <a:endParaRPr lang="en-US" dirty="0"/>
                     </a:p>
                   </a:txBody>
                   <a:tcPr/>
@@ -7798,6 +7725,16 @@
                     <a:bodyPr/>
                     <a:lstStyle/>
                     <a:p>
+                      <a:endParaRPr lang="en-US" dirty="0"/>
+                    </a:p>
+                  </a:txBody>
+                  <a:tcPr/>
+                </a:tc>
+                <a:tc>
+                  <a:txBody>
+                    <a:bodyPr/>
+                    <a:lstStyle/>
+                    <a:p>
                       <a:endParaRPr lang="en-US"/>
                     </a:p>
                   </a:txBody>
@@ -7819,26 +7756,6 @@
                     <a:lstStyle/>
                     <a:p>
                       <a:endParaRPr lang="en-US"/>
-                    </a:p>
-                  </a:txBody>
-                  <a:tcPr/>
-                </a:tc>
-                <a:tc>
-                  <a:txBody>
-                    <a:bodyPr/>
-                    <a:lstStyle/>
-                    <a:p>
-                      <a:endParaRPr lang="en-US"/>
-                    </a:p>
-                  </a:txBody>
-                  <a:tcPr/>
-                </a:tc>
-                <a:tc>
-                  <a:txBody>
-                    <a:bodyPr/>
-                    <a:lstStyle/>
-                    <a:p>
-                      <a:endParaRPr lang="en-US" dirty="0"/>
                     </a:p>
                   </a:txBody>
                   <a:tcPr/>
@@ -7905,6 +7822,16 @@
                     <a:bodyPr/>
                     <a:lstStyle/>
                     <a:p>
+                      <a:endParaRPr lang="en-US" dirty="0"/>
+                    </a:p>
+                  </a:txBody>
+                  <a:tcPr/>
+                </a:tc>
+                <a:tc>
+                  <a:txBody>
+                    <a:bodyPr/>
+                    <a:lstStyle/>
+                    <a:p>
                       <a:endParaRPr lang="en-US"/>
                     </a:p>
                   </a:txBody>
@@ -7926,26 +7853,6 @@
                     <a:lstStyle/>
                     <a:p>
                       <a:endParaRPr lang="en-US"/>
-                    </a:p>
-                  </a:txBody>
-                  <a:tcPr/>
-                </a:tc>
-                <a:tc>
-                  <a:txBody>
-                    <a:bodyPr/>
-                    <a:lstStyle/>
-                    <a:p>
-                      <a:endParaRPr lang="en-US"/>
-                    </a:p>
-                  </a:txBody>
-                  <a:tcPr/>
-                </a:tc>
-                <a:tc>
-                  <a:txBody>
-                    <a:bodyPr/>
-                    <a:lstStyle/>
-                    <a:p>
-                      <a:endParaRPr lang="en-US" dirty="0"/>
                     </a:p>
                   </a:txBody>
                   <a:tcPr/>
@@ -8012,6 +7919,16 @@
                     <a:bodyPr/>
                     <a:lstStyle/>
                     <a:p>
+                      <a:endParaRPr lang="en-US" dirty="0"/>
+                    </a:p>
+                  </a:txBody>
+                  <a:tcPr/>
+                </a:tc>
+                <a:tc>
+                  <a:txBody>
+                    <a:bodyPr/>
+                    <a:lstStyle/>
+                    <a:p>
                       <a:endParaRPr lang="en-US"/>
                     </a:p>
                   </a:txBody>
@@ -8033,26 +7950,6 @@
                     <a:lstStyle/>
                     <a:p>
                       <a:endParaRPr lang="en-US"/>
-                    </a:p>
-                  </a:txBody>
-                  <a:tcPr/>
-                </a:tc>
-                <a:tc>
-                  <a:txBody>
-                    <a:bodyPr/>
-                    <a:lstStyle/>
-                    <a:p>
-                      <a:endParaRPr lang="en-US"/>
-                    </a:p>
-                  </a:txBody>
-                  <a:tcPr/>
-                </a:tc>
-                <a:tc>
-                  <a:txBody>
-                    <a:bodyPr/>
-                    <a:lstStyle/>
-                    <a:p>
-                      <a:endParaRPr lang="en-US" dirty="0"/>
                     </a:p>
                   </a:txBody>
                   <a:tcPr/>

</xml_diff>

<commit_message>
finished the ticker search bar, and a company details box.   Still having a hard time with the details dropdown.  Still need the protfolio table.
</commit_message>
<xml_diff>
--- a/assets/mock-up.pptx
+++ b/assets/mock-up.pptx
@@ -1317,7 +1317,7 @@
           <a:p>
             <a:fld id="{A714743B-588B-4D60-9EB5-8E9A17C253EF}" type="datetimeFigureOut">
               <a:rPr lang="en-US" smtClean="0"/>
-              <a:t>6/1/2022</a:t>
+              <a:t>6/3/2022</a:t>
             </a:fld>
             <a:endParaRPr lang="en-US"/>
           </a:p>
@@ -1515,7 +1515,7 @@
           <a:p>
             <a:fld id="{A714743B-588B-4D60-9EB5-8E9A17C253EF}" type="datetimeFigureOut">
               <a:rPr lang="en-US" smtClean="0"/>
-              <a:t>6/1/2022</a:t>
+              <a:t>6/3/2022</a:t>
             </a:fld>
             <a:endParaRPr lang="en-US"/>
           </a:p>
@@ -1723,7 +1723,7 @@
           <a:p>
             <a:fld id="{A714743B-588B-4D60-9EB5-8E9A17C253EF}" type="datetimeFigureOut">
               <a:rPr lang="en-US" smtClean="0"/>
-              <a:t>6/1/2022</a:t>
+              <a:t>6/3/2022</a:t>
             </a:fld>
             <a:endParaRPr lang="en-US"/>
           </a:p>
@@ -1921,7 +1921,7 @@
           <a:p>
             <a:fld id="{A714743B-588B-4D60-9EB5-8E9A17C253EF}" type="datetimeFigureOut">
               <a:rPr lang="en-US" smtClean="0"/>
-              <a:t>6/1/2022</a:t>
+              <a:t>6/3/2022</a:t>
             </a:fld>
             <a:endParaRPr lang="en-US"/>
           </a:p>
@@ -2196,7 +2196,7 @@
           <a:p>
             <a:fld id="{A714743B-588B-4D60-9EB5-8E9A17C253EF}" type="datetimeFigureOut">
               <a:rPr lang="en-US" smtClean="0"/>
-              <a:t>6/1/2022</a:t>
+              <a:t>6/3/2022</a:t>
             </a:fld>
             <a:endParaRPr lang="en-US"/>
           </a:p>
@@ -2461,7 +2461,7 @@
           <a:p>
             <a:fld id="{A714743B-588B-4D60-9EB5-8E9A17C253EF}" type="datetimeFigureOut">
               <a:rPr lang="en-US" smtClean="0"/>
-              <a:t>6/1/2022</a:t>
+              <a:t>6/3/2022</a:t>
             </a:fld>
             <a:endParaRPr lang="en-US"/>
           </a:p>
@@ -2873,7 +2873,7 @@
           <a:p>
             <a:fld id="{A714743B-588B-4D60-9EB5-8E9A17C253EF}" type="datetimeFigureOut">
               <a:rPr lang="en-US" smtClean="0"/>
-              <a:t>6/1/2022</a:t>
+              <a:t>6/3/2022</a:t>
             </a:fld>
             <a:endParaRPr lang="en-US"/>
           </a:p>
@@ -3014,7 +3014,7 @@
           <a:p>
             <a:fld id="{A714743B-588B-4D60-9EB5-8E9A17C253EF}" type="datetimeFigureOut">
               <a:rPr lang="en-US" smtClean="0"/>
-              <a:t>6/1/2022</a:t>
+              <a:t>6/3/2022</a:t>
             </a:fld>
             <a:endParaRPr lang="en-US"/>
           </a:p>
@@ -3127,7 +3127,7 @@
           <a:p>
             <a:fld id="{A714743B-588B-4D60-9EB5-8E9A17C253EF}" type="datetimeFigureOut">
               <a:rPr lang="en-US" smtClean="0"/>
-              <a:t>6/1/2022</a:t>
+              <a:t>6/3/2022</a:t>
             </a:fld>
             <a:endParaRPr lang="en-US"/>
           </a:p>
@@ -3438,7 +3438,7 @@
           <a:p>
             <a:fld id="{A714743B-588B-4D60-9EB5-8E9A17C253EF}" type="datetimeFigureOut">
               <a:rPr lang="en-US" smtClean="0"/>
-              <a:t>6/1/2022</a:t>
+              <a:t>6/3/2022</a:t>
             </a:fld>
             <a:endParaRPr lang="en-US"/>
           </a:p>
@@ -3726,7 +3726,7 @@
           <a:p>
             <a:fld id="{A714743B-588B-4D60-9EB5-8E9A17C253EF}" type="datetimeFigureOut">
               <a:rPr lang="en-US" smtClean="0"/>
-              <a:t>6/1/2022</a:t>
+              <a:t>6/3/2022</a:t>
             </a:fld>
             <a:endParaRPr lang="en-US"/>
           </a:p>
@@ -3967,7 +3967,7 @@
           <a:p>
             <a:fld id="{A714743B-588B-4D60-9EB5-8E9A17C253EF}" type="datetimeFigureOut">
               <a:rPr lang="en-US" smtClean="0"/>
-              <a:t>6/1/2022</a:t>
+              <a:t>6/3/2022</a:t>
             </a:fld>
             <a:endParaRPr lang="en-US"/>
           </a:p>
@@ -6596,13 +6596,18 @@
           <a:p>
             <a:pPr algn="ctr"/>
             <a:r>
-              <a:rPr lang="en-US" dirty="0">
+              <a:rPr lang="en-US">
                 <a:solidFill>
                   <a:schemeClr val="tx1"/>
                 </a:solidFill>
               </a:rPr>
               <a:t>Stock Ticker Info</a:t>
             </a:r>
+            <a:endParaRPr lang="en-US" dirty="0">
+              <a:solidFill>
+                <a:schemeClr val="tx1"/>
+              </a:solidFill>
+            </a:endParaRPr>
           </a:p>
         </p:txBody>
       </p:sp>
@@ -6975,6 +6980,356 @@
           </a:p>
         </p:txBody>
       </p:sp>
+      <p:graphicFrame>
+        <p:nvGraphicFramePr>
+          <p:cNvPr id="18" name="Table 10">
+            <a:extLst>
+              <a:ext uri="{FF2B5EF4-FFF2-40B4-BE49-F238E27FC236}">
+                <a16:creationId xmlns:a16="http://schemas.microsoft.com/office/drawing/2014/main" id="{451E34D4-5C4F-A8E8-AAF7-FD2911F04ABB}"/>
+              </a:ext>
+            </a:extLst>
+          </p:cNvPr>
+          <p:cNvGraphicFramePr>
+            <a:graphicFrameLocks noGrp="1"/>
+          </p:cNvGraphicFramePr>
+          <p:nvPr>
+            <p:extLst>
+              <p:ext uri="{D42A27DB-BD31-4B8C-83A1-F6EECF244321}">
+                <p14:modId xmlns:p14="http://schemas.microsoft.com/office/powerpoint/2010/main" val="1714054327"/>
+              </p:ext>
+            </p:extLst>
+          </p:nvPr>
+        </p:nvGraphicFramePr>
+        <p:xfrm>
+          <a:off x="5035140" y="950819"/>
+          <a:ext cx="6840559" cy="1523675"/>
+        </p:xfrm>
+        <a:graphic>
+          <a:graphicData uri="http://schemas.openxmlformats.org/drawingml/2006/table">
+            <a:tbl>
+              <a:tblPr firstRow="1" bandRow="1">
+                <a:tableStyleId>{5C22544A-7EE6-4342-B048-85BDC9FD1C3A}</a:tableStyleId>
+              </a:tblPr>
+              <a:tblGrid>
+                <a:gridCol w="1130018">
+                  <a:extLst>
+                    <a:ext uri="{9D8B030D-6E8A-4147-A177-3AD203B41FA5}">
+                      <a16:colId xmlns:a16="http://schemas.microsoft.com/office/drawing/2014/main" val="2960611712"/>
+                    </a:ext>
+                  </a:extLst>
+                </a:gridCol>
+                <a:gridCol w="1716133">
+                  <a:extLst>
+                    <a:ext uri="{9D8B030D-6E8A-4147-A177-3AD203B41FA5}">
+                      <a16:colId xmlns:a16="http://schemas.microsoft.com/office/drawing/2014/main" val="526014814"/>
+                    </a:ext>
+                  </a:extLst>
+                </a:gridCol>
+                <a:gridCol w="1832145">
+                  <a:extLst>
+                    <a:ext uri="{9D8B030D-6E8A-4147-A177-3AD203B41FA5}">
+                      <a16:colId xmlns:a16="http://schemas.microsoft.com/office/drawing/2014/main" val="3458990169"/>
+                    </a:ext>
+                  </a:extLst>
+                </a:gridCol>
+                <a:gridCol w="2162263">
+                  <a:extLst>
+                    <a:ext uri="{9D8B030D-6E8A-4147-A177-3AD203B41FA5}">
+                      <a16:colId xmlns:a16="http://schemas.microsoft.com/office/drawing/2014/main" val="3445635662"/>
+                    </a:ext>
+                  </a:extLst>
+                </a:gridCol>
+              </a:tblGrid>
+              <a:tr h="304170">
+                <a:tc gridSpan="4">
+                  <a:txBody>
+                    <a:bodyPr/>
+                    <a:lstStyle/>
+                    <a:p>
+                      <a:pPr algn="ctr"/>
+                      <a:r>
+                        <a:rPr lang="en-US" dirty="0">
+                          <a:solidFill>
+                            <a:schemeClr val="tx1"/>
+                          </a:solidFill>
+                        </a:rPr>
+                        <a:t>Stock</a:t>
+                      </a:r>
+                    </a:p>
+                  </a:txBody>
+                  <a:tcPr>
+                    <a:solidFill>
+                      <a:schemeClr val="bg1">
+                        <a:lumMod val="75000"/>
+                      </a:schemeClr>
+                    </a:solidFill>
+                  </a:tcPr>
+                </a:tc>
+                <a:tc hMerge="1">
+                  <a:txBody>
+                    <a:bodyPr/>
+                    <a:lstStyle/>
+                    <a:p>
+                      <a:r>
+                        <a:rPr lang="en-US" dirty="0">
+                          <a:solidFill>
+                            <a:schemeClr val="tx1"/>
+                          </a:solidFill>
+                        </a:rPr>
+                        <a:t># of shares</a:t>
+                      </a:r>
+                    </a:p>
+                  </a:txBody>
+                  <a:tcPr>
+                    <a:solidFill>
+                      <a:schemeClr val="bg1">
+                        <a:lumMod val="75000"/>
+                      </a:schemeClr>
+                    </a:solidFill>
+                  </a:tcPr>
+                </a:tc>
+                <a:tc hMerge="1">
+                  <a:txBody>
+                    <a:bodyPr/>
+                    <a:lstStyle/>
+                    <a:p>
+                      <a:r>
+                        <a:rPr lang="en-US" dirty="0">
+                          <a:solidFill>
+                            <a:schemeClr val="tx1"/>
+                          </a:solidFill>
+                        </a:rPr>
+                        <a:t>Added Date</a:t>
+                      </a:r>
+                    </a:p>
+                  </a:txBody>
+                  <a:tcPr>
+                    <a:solidFill>
+                      <a:schemeClr val="bg1">
+                        <a:lumMod val="75000"/>
+                      </a:schemeClr>
+                    </a:solidFill>
+                  </a:tcPr>
+                </a:tc>
+                <a:tc hMerge="1">
+                  <a:txBody>
+                    <a:bodyPr/>
+                    <a:lstStyle/>
+                    <a:p>
+                      <a:r>
+                        <a:rPr lang="en-US" dirty="0">
+                          <a:solidFill>
+                            <a:schemeClr val="tx1"/>
+                          </a:solidFill>
+                        </a:rPr>
+                        <a:t>Purchase Price</a:t>
+                      </a:r>
+                    </a:p>
+                  </a:txBody>
+                  <a:tcPr>
+                    <a:solidFill>
+                      <a:schemeClr val="bg1">
+                        <a:lumMod val="75000"/>
+                      </a:schemeClr>
+                    </a:solidFill>
+                  </a:tcPr>
+                </a:tc>
+                <a:extLst>
+                  <a:ext uri="{0D108BD9-81ED-4DB2-BD59-A6C34878D82A}">
+                    <a16:rowId xmlns:a16="http://schemas.microsoft.com/office/drawing/2014/main" val="1667031341"/>
+                  </a:ext>
+                </a:extLst>
+              </a:tr>
+              <a:tr h="304170">
+                <a:tc>
+                  <a:txBody>
+                    <a:bodyPr/>
+                    <a:lstStyle/>
+                    <a:p>
+                      <a:r>
+                        <a:rPr lang="en-US" dirty="0">
+                          <a:solidFill>
+                            <a:schemeClr val="tx1"/>
+                          </a:solidFill>
+                        </a:rPr>
+                        <a:t>Price</a:t>
+                      </a:r>
+                    </a:p>
+                  </a:txBody>
+                  <a:tcPr>
+                    <a:solidFill>
+                      <a:schemeClr val="bg1">
+                        <a:lumMod val="75000"/>
+                      </a:schemeClr>
+                    </a:solidFill>
+                  </a:tcPr>
+                </a:tc>
+                <a:tc>
+                  <a:txBody>
+                    <a:bodyPr/>
+                    <a:lstStyle/>
+                    <a:p>
+                      <a:r>
+                        <a:rPr lang="en-US" dirty="0">
+                          <a:solidFill>
+                            <a:schemeClr val="tx1"/>
+                          </a:solidFill>
+                        </a:rPr>
+                        <a:t>52 Week High</a:t>
+                      </a:r>
+                    </a:p>
+                  </a:txBody>
+                  <a:tcPr>
+                    <a:solidFill>
+                      <a:schemeClr val="bg1">
+                        <a:lumMod val="75000"/>
+                      </a:schemeClr>
+                    </a:solidFill>
+                  </a:tcPr>
+                </a:tc>
+                <a:tc>
+                  <a:txBody>
+                    <a:bodyPr/>
+                    <a:lstStyle/>
+                    <a:p>
+                      <a:r>
+                        <a:rPr lang="en-US" dirty="0">
+                          <a:solidFill>
+                            <a:schemeClr val="tx1"/>
+                          </a:solidFill>
+                        </a:rPr>
+                        <a:t>52 Week Low</a:t>
+                      </a:r>
+                    </a:p>
+                  </a:txBody>
+                  <a:tcPr>
+                    <a:solidFill>
+                      <a:schemeClr val="bg1">
+                        <a:lumMod val="75000"/>
+                      </a:schemeClr>
+                    </a:solidFill>
+                  </a:tcPr>
+                </a:tc>
+                <a:tc>
+                  <a:txBody>
+                    <a:bodyPr/>
+                    <a:lstStyle/>
+                    <a:p>
+                      <a:r>
+                        <a:rPr lang="en-US" dirty="0">
+                          <a:solidFill>
+                            <a:schemeClr val="tx1"/>
+                          </a:solidFill>
+                        </a:rPr>
+                        <a:t>Last Year % Change</a:t>
+                      </a:r>
+                    </a:p>
+                  </a:txBody>
+                  <a:tcPr>
+                    <a:solidFill>
+                      <a:schemeClr val="bg1">
+                        <a:lumMod val="75000"/>
+                      </a:schemeClr>
+                    </a:solidFill>
+                  </a:tcPr>
+                </a:tc>
+                <a:extLst>
+                  <a:ext uri="{0D108BD9-81ED-4DB2-BD59-A6C34878D82A}">
+                    <a16:rowId xmlns:a16="http://schemas.microsoft.com/office/drawing/2014/main" val="2870962332"/>
+                  </a:ext>
+                </a:extLst>
+              </a:tr>
+              <a:tr h="792155">
+                <a:tc>
+                  <a:txBody>
+                    <a:bodyPr/>
+                    <a:lstStyle/>
+                    <a:p>
+                      <a:r>
+                        <a:rPr lang="en-US" dirty="0" err="1"/>
+                        <a:t>Curr</a:t>
+                      </a:r>
+                      <a:r>
+                        <a:rPr lang="en-US" dirty="0"/>
+                        <a:t> Val</a:t>
+                      </a:r>
+                    </a:p>
+                  </a:txBody>
+                  <a:tcPr/>
+                </a:tc>
+                <a:tc>
+                  <a:txBody>
+                    <a:bodyPr/>
+                    <a:lstStyle/>
+                    <a:p>
+                      <a:r>
+                        <a:rPr lang="en-US" dirty="0"/>
+                        <a:t>52wk high (API Cal)</a:t>
+                      </a:r>
+                    </a:p>
+                  </a:txBody>
+                  <a:tcPr/>
+                </a:tc>
+                <a:tc>
+                  <a:txBody>
+                    <a:bodyPr/>
+                    <a:lstStyle/>
+                    <a:p>
+                      <a:r>
+                        <a:rPr lang="en-US" dirty="0"/>
+                        <a:t>52 </a:t>
+                      </a:r>
+                      <a:r>
+                        <a:rPr lang="en-US" dirty="0" err="1"/>
+                        <a:t>wk</a:t>
+                      </a:r>
+                      <a:r>
+                        <a:rPr lang="en-US" dirty="0"/>
+                        <a:t> Low (</a:t>
+                      </a:r>
+                      <a:r>
+                        <a:rPr lang="en-US" dirty="0" err="1"/>
+                        <a:t>api</a:t>
+                      </a:r>
+                      <a:r>
+                        <a:rPr lang="en-US" dirty="0"/>
+                        <a:t> </a:t>
+                      </a:r>
+                      <a:r>
+                        <a:rPr lang="en-US" dirty="0" err="1"/>
+                        <a:t>cal</a:t>
+                      </a:r>
+                      <a:r>
+                        <a:rPr lang="en-US" dirty="0"/>
+                        <a:t>)</a:t>
+                      </a:r>
+                    </a:p>
+                  </a:txBody>
+                  <a:tcPr/>
+                </a:tc>
+                <a:tc>
+                  <a:txBody>
+                    <a:bodyPr/>
+                    <a:lstStyle/>
+                    <a:p>
+                      <a:r>
+                        <a:rPr lang="en-US" dirty="0"/>
+                        <a:t>Float - Daily price on added date</a:t>
+                      </a:r>
+                    </a:p>
+                  </a:txBody>
+                  <a:tcPr/>
+                </a:tc>
+                <a:extLst>
+                  <a:ext uri="{0D108BD9-81ED-4DB2-BD59-A6C34878D82A}">
+                    <a16:rowId xmlns:a16="http://schemas.microsoft.com/office/drawing/2014/main" val="1743634555"/>
+                  </a:ext>
+                </a:extLst>
+              </a:tr>
+            </a:tbl>
+          </a:graphicData>
+        </a:graphic>
+      </p:graphicFrame>
     </p:spTree>
     <p:extLst>
       <p:ext uri="{BB962C8B-B14F-4D97-AF65-F5344CB8AC3E}">

</xml_diff>

<commit_message>
user page is complete.  now working on putting together the portfolio pages.
</commit_message>
<xml_diff>
--- a/assets/mock-up.pptx
+++ b/assets/mock-up.pptx
@@ -1318,7 +1318,7 @@
           <a:p>
             <a:fld id="{A714743B-588B-4D60-9EB5-8E9A17C253EF}" type="datetimeFigureOut">
               <a:rPr lang="en-US" smtClean="0"/>
-              <a:t>6/4/2022</a:t>
+              <a:t>6/5/2022</a:t>
             </a:fld>
             <a:endParaRPr lang="en-US"/>
           </a:p>
@@ -1516,7 +1516,7 @@
           <a:p>
             <a:fld id="{A714743B-588B-4D60-9EB5-8E9A17C253EF}" type="datetimeFigureOut">
               <a:rPr lang="en-US" smtClean="0"/>
-              <a:t>6/4/2022</a:t>
+              <a:t>6/5/2022</a:t>
             </a:fld>
             <a:endParaRPr lang="en-US"/>
           </a:p>
@@ -1724,7 +1724,7 @@
           <a:p>
             <a:fld id="{A714743B-588B-4D60-9EB5-8E9A17C253EF}" type="datetimeFigureOut">
               <a:rPr lang="en-US" smtClean="0"/>
-              <a:t>6/4/2022</a:t>
+              <a:t>6/5/2022</a:t>
             </a:fld>
             <a:endParaRPr lang="en-US"/>
           </a:p>
@@ -1922,7 +1922,7 @@
           <a:p>
             <a:fld id="{A714743B-588B-4D60-9EB5-8E9A17C253EF}" type="datetimeFigureOut">
               <a:rPr lang="en-US" smtClean="0"/>
-              <a:t>6/4/2022</a:t>
+              <a:t>6/5/2022</a:t>
             </a:fld>
             <a:endParaRPr lang="en-US"/>
           </a:p>
@@ -2197,7 +2197,7 @@
           <a:p>
             <a:fld id="{A714743B-588B-4D60-9EB5-8E9A17C253EF}" type="datetimeFigureOut">
               <a:rPr lang="en-US" smtClean="0"/>
-              <a:t>6/4/2022</a:t>
+              <a:t>6/5/2022</a:t>
             </a:fld>
             <a:endParaRPr lang="en-US"/>
           </a:p>
@@ -2462,7 +2462,7 @@
           <a:p>
             <a:fld id="{A714743B-588B-4D60-9EB5-8E9A17C253EF}" type="datetimeFigureOut">
               <a:rPr lang="en-US" smtClean="0"/>
-              <a:t>6/4/2022</a:t>
+              <a:t>6/5/2022</a:t>
             </a:fld>
             <a:endParaRPr lang="en-US"/>
           </a:p>
@@ -2874,7 +2874,7 @@
           <a:p>
             <a:fld id="{A714743B-588B-4D60-9EB5-8E9A17C253EF}" type="datetimeFigureOut">
               <a:rPr lang="en-US" smtClean="0"/>
-              <a:t>6/4/2022</a:t>
+              <a:t>6/5/2022</a:t>
             </a:fld>
             <a:endParaRPr lang="en-US"/>
           </a:p>
@@ -3015,7 +3015,7 @@
           <a:p>
             <a:fld id="{A714743B-588B-4D60-9EB5-8E9A17C253EF}" type="datetimeFigureOut">
               <a:rPr lang="en-US" smtClean="0"/>
-              <a:t>6/4/2022</a:t>
+              <a:t>6/5/2022</a:t>
             </a:fld>
             <a:endParaRPr lang="en-US"/>
           </a:p>
@@ -3128,7 +3128,7 @@
           <a:p>
             <a:fld id="{A714743B-588B-4D60-9EB5-8E9A17C253EF}" type="datetimeFigureOut">
               <a:rPr lang="en-US" smtClean="0"/>
-              <a:t>6/4/2022</a:t>
+              <a:t>6/5/2022</a:t>
             </a:fld>
             <a:endParaRPr lang="en-US"/>
           </a:p>
@@ -3439,7 +3439,7 @@
           <a:p>
             <a:fld id="{A714743B-588B-4D60-9EB5-8E9A17C253EF}" type="datetimeFigureOut">
               <a:rPr lang="en-US" smtClean="0"/>
-              <a:t>6/4/2022</a:t>
+              <a:t>6/5/2022</a:t>
             </a:fld>
             <a:endParaRPr lang="en-US"/>
           </a:p>
@@ -3727,7 +3727,7 @@
           <a:p>
             <a:fld id="{A714743B-588B-4D60-9EB5-8E9A17C253EF}" type="datetimeFigureOut">
               <a:rPr lang="en-US" smtClean="0"/>
-              <a:t>6/4/2022</a:t>
+              <a:t>6/5/2022</a:t>
             </a:fld>
             <a:endParaRPr lang="en-US"/>
           </a:p>
@@ -3968,7 +3968,7 @@
           <a:p>
             <a:fld id="{A714743B-588B-4D60-9EB5-8E9A17C253EF}" type="datetimeFigureOut">
               <a:rPr lang="en-US" smtClean="0"/>
-              <a:t>6/4/2022</a:t>
+              <a:t>6/5/2022</a:t>
             </a:fld>
             <a:endParaRPr lang="en-US"/>
           </a:p>

</xml_diff>